<commit_message>
Add code for num_quiz and fix "double-tap scoring" bug
</commit_message>
<xml_diff>
--- a/Group Presentation.pptx
+++ b/Group Presentation.pptx
@@ -111,7 +111,7 @@
   </p:defaultTextStyle>
   <p:extLst>
     <p:ext uri="{EFAFB233-063F-42B5-8137-9DF3F51BA10A}">
-      <p15:sldGuideLst xmlns:p15="http://schemas.microsoft.com/office/powerpoint/2012/main" xmlns="">
+      <p15:sldGuideLst xmlns:p15="http://schemas.microsoft.com/office/powerpoint/2012/main">
         <p15:guide id="1" orient="horz" pos="2160">
           <p15:clr>
             <a:srgbClr val="A4A3A4"/>
@@ -311,7 +311,7 @@
           <a:p>
             <a:fld id="{6B57480A-9F2D-42A4-ADF3-BA8EF3EBC404}" type="datetimeFigureOut">
               <a:rPr lang="en-GB" smtClean="0"/>
-              <a:t>08/12/14</a:t>
+              <a:t>10/12/2014</a:t>
             </a:fld>
             <a:endParaRPr lang="en-GB"/>
           </a:p>
@@ -586,7 +586,7 @@
           <a:p>
             <a:fld id="{6B57480A-9F2D-42A4-ADF3-BA8EF3EBC404}" type="datetimeFigureOut">
               <a:rPr lang="en-GB" smtClean="0"/>
-              <a:t>08/12/14</a:t>
+              <a:t>10/12/2014</a:t>
             </a:fld>
             <a:endParaRPr lang="en-GB"/>
           </a:p>
@@ -780,7 +780,7 @@
           <a:p>
             <a:fld id="{6B57480A-9F2D-42A4-ADF3-BA8EF3EBC404}" type="datetimeFigureOut">
               <a:rPr lang="en-GB" smtClean="0"/>
-              <a:t>08/12/14</a:t>
+              <a:t>10/12/2014</a:t>
             </a:fld>
             <a:endParaRPr lang="en-GB"/>
           </a:p>
@@ -1048,7 +1048,7 @@
           <a:p>
             <a:fld id="{6B57480A-9F2D-42A4-ADF3-BA8EF3EBC404}" type="datetimeFigureOut">
               <a:rPr lang="en-GB" smtClean="0"/>
-              <a:t>08/12/14</a:t>
+              <a:t>10/12/2014</a:t>
             </a:fld>
             <a:endParaRPr lang="en-GB"/>
           </a:p>
@@ -1380,7 +1380,7 @@
           <a:p>
             <a:fld id="{6B57480A-9F2D-42A4-ADF3-BA8EF3EBC404}" type="datetimeFigureOut">
               <a:rPr lang="en-GB" smtClean="0"/>
-              <a:t>08/12/14</a:t>
+              <a:t>10/12/2014</a:t>
             </a:fld>
             <a:endParaRPr lang="en-GB"/>
           </a:p>
@@ -1990,7 +1990,7 @@
           <a:p>
             <a:fld id="{6B57480A-9F2D-42A4-ADF3-BA8EF3EBC404}" type="datetimeFigureOut">
               <a:rPr lang="en-GB" smtClean="0"/>
-              <a:t>08/12/14</a:t>
+              <a:t>10/12/2014</a:t>
             </a:fld>
             <a:endParaRPr lang="en-GB"/>
           </a:p>
@@ -2837,7 +2837,7 @@
           <a:p>
             <a:fld id="{6B57480A-9F2D-42A4-ADF3-BA8EF3EBC404}" type="datetimeFigureOut">
               <a:rPr lang="en-GB" smtClean="0"/>
-              <a:t>08/12/14</a:t>
+              <a:t>10/12/2014</a:t>
             </a:fld>
             <a:endParaRPr lang="en-GB"/>
           </a:p>
@@ -3007,7 +3007,7 @@
           <a:p>
             <a:fld id="{6B57480A-9F2D-42A4-ADF3-BA8EF3EBC404}" type="datetimeFigureOut">
               <a:rPr lang="en-GB" smtClean="0"/>
-              <a:t>08/12/14</a:t>
+              <a:t>10/12/2014</a:t>
             </a:fld>
             <a:endParaRPr lang="en-GB"/>
           </a:p>
@@ -3187,7 +3187,7 @@
           <a:p>
             <a:fld id="{6B57480A-9F2D-42A4-ADF3-BA8EF3EBC404}" type="datetimeFigureOut">
               <a:rPr lang="en-GB" smtClean="0"/>
-              <a:t>08/12/14</a:t>
+              <a:t>10/12/2014</a:t>
             </a:fld>
             <a:endParaRPr lang="en-GB"/>
           </a:p>
@@ -3357,7 +3357,7 @@
           <a:p>
             <a:fld id="{6B57480A-9F2D-42A4-ADF3-BA8EF3EBC404}" type="datetimeFigureOut">
               <a:rPr lang="en-GB" smtClean="0"/>
-              <a:t>08/12/14</a:t>
+              <a:t>10/12/2014</a:t>
             </a:fld>
             <a:endParaRPr lang="en-GB"/>
           </a:p>
@@ -3601,7 +3601,7 @@
           <a:p>
             <a:fld id="{6B57480A-9F2D-42A4-ADF3-BA8EF3EBC404}" type="datetimeFigureOut">
               <a:rPr lang="en-GB" smtClean="0"/>
-              <a:t>08/12/14</a:t>
+              <a:t>10/12/2014</a:t>
             </a:fld>
             <a:endParaRPr lang="en-GB"/>
           </a:p>
@@ -3893,7 +3893,7 @@
           <a:p>
             <a:fld id="{6B57480A-9F2D-42A4-ADF3-BA8EF3EBC404}" type="datetimeFigureOut">
               <a:rPr lang="en-GB" smtClean="0"/>
-              <a:t>08/12/14</a:t>
+              <a:t>10/12/2014</a:t>
             </a:fld>
             <a:endParaRPr lang="en-GB"/>
           </a:p>
@@ -4331,7 +4331,7 @@
           <a:p>
             <a:fld id="{6B57480A-9F2D-42A4-ADF3-BA8EF3EBC404}" type="datetimeFigureOut">
               <a:rPr lang="en-GB" smtClean="0"/>
-              <a:t>08/12/14</a:t>
+              <a:t>10/12/2014</a:t>
             </a:fld>
             <a:endParaRPr lang="en-GB"/>
           </a:p>
@@ -4449,7 +4449,7 @@
           <a:p>
             <a:fld id="{6B57480A-9F2D-42A4-ADF3-BA8EF3EBC404}" type="datetimeFigureOut">
               <a:rPr lang="en-GB" smtClean="0"/>
-              <a:t>08/12/14</a:t>
+              <a:t>10/12/2014</a:t>
             </a:fld>
             <a:endParaRPr lang="en-GB"/>
           </a:p>
@@ -4544,7 +4544,7 @@
           <a:p>
             <a:fld id="{6B57480A-9F2D-42A4-ADF3-BA8EF3EBC404}" type="datetimeFigureOut">
               <a:rPr lang="en-GB" smtClean="0"/>
-              <a:t>08/12/14</a:t>
+              <a:t>10/12/2014</a:t>
             </a:fld>
             <a:endParaRPr lang="en-GB"/>
           </a:p>
@@ -4823,7 +4823,7 @@
           <a:p>
             <a:fld id="{6B57480A-9F2D-42A4-ADF3-BA8EF3EBC404}" type="datetimeFigureOut">
               <a:rPr lang="en-GB" smtClean="0"/>
-              <a:t>08/12/14</a:t>
+              <a:t>10/12/2014</a:t>
             </a:fld>
             <a:endParaRPr lang="en-GB"/>
           </a:p>
@@ -5098,7 +5098,7 @@
           <a:p>
             <a:fld id="{6B57480A-9F2D-42A4-ADF3-BA8EF3EBC404}" type="datetimeFigureOut">
               <a:rPr lang="en-GB" smtClean="0"/>
-              <a:t>08/12/14</a:t>
+              <a:t>10/12/2014</a:t>
             </a:fld>
             <a:endParaRPr lang="en-GB"/>
           </a:p>
@@ -5527,7 +5527,7 @@
           <a:p>
             <a:fld id="{6B57480A-9F2D-42A4-ADF3-BA8EF3EBC404}" type="datetimeFigureOut">
               <a:rPr lang="en-GB" smtClean="0"/>
-              <a:t>08/12/14</a:t>
+              <a:t>10/12/2014</a:t>
             </a:fld>
             <a:endParaRPr lang="en-GB"/>
           </a:p>
@@ -6104,15 +6104,7 @@
                   <a:schemeClr val="tx1"/>
                 </a:solidFill>
               </a:rPr>
-              <a:t>n </a:t>
-            </a:r>
-            <a:r>
-              <a:rPr lang="en-GB" sz="4000" dirty="0" smtClean="0">
-                <a:solidFill>
-                  <a:schemeClr val="tx1"/>
-                </a:solidFill>
-              </a:rPr>
-              <a:t>educational app for children</a:t>
+              <a:t>n educational app for children</a:t>
             </a:r>
             <a:endParaRPr lang="en-GB" sz="4000" dirty="0">
               <a:solidFill>
@@ -6181,7 +6173,7 @@
   <p:timing>
     <p:tnLst>
       <p:par>
-        <p:cTn xmlns:p14="http://schemas.microsoft.com/office/powerpoint/2010/main" id="1" dur="indefinite" restart="never" nodeType="tmRoot"/>
+        <p:cTn id="1" dur="indefinite" restart="never" nodeType="tmRoot"/>
       </p:par>
     </p:tnLst>
   </p:timing>
@@ -6283,27 +6275,7 @@
             </a:r>
             <a:r>
               <a:rPr lang="en-GB" sz="2400" dirty="0" smtClean="0"/>
-              <a:t>nursery </a:t>
-            </a:r>
-            <a:r>
-              <a:rPr lang="en-GB" sz="2400" dirty="0" smtClean="0"/>
-              <a:t>and reception aged 3 – 5 who </a:t>
-            </a:r>
-            <a:r>
-              <a:rPr lang="en-GB" sz="2400" dirty="0" smtClean="0"/>
-              <a:t>are learning basic words and numbers for the first time. Our secondary target market was parents of </a:t>
-            </a:r>
-            <a:r>
-              <a:rPr lang="en-GB" sz="2400" dirty="0" smtClean="0"/>
-              <a:t>these</a:t>
-            </a:r>
-            <a:r>
-              <a:rPr lang="en-GB" sz="2400" dirty="0" smtClean="0"/>
-              <a:t> </a:t>
-            </a:r>
-            <a:r>
-              <a:rPr lang="en-GB" sz="2400" dirty="0" smtClean="0"/>
-              <a:t>children and they would primarily be in the age groups of 25 – 44.</a:t>
+              <a:t>nursery and reception aged 3 – 5 who are learning basic words and numbers for the first time. Our secondary target market was parents of these children and they would primarily be in the age groups of 25 – 44.</a:t>
             </a:r>
           </a:p>
           <a:p>
@@ -6328,7 +6300,7 @@
   <p:timing>
     <p:tnLst>
       <p:par>
-        <p:cTn xmlns:p14="http://schemas.microsoft.com/office/powerpoint/2010/main" id="1" dur="indefinite" restart="never" nodeType="tmRoot"/>
+        <p:cTn id="1" dur="indefinite" restart="never" nodeType="tmRoot"/>
       </p:par>
     </p:tnLst>
   </p:timing>
@@ -6435,31 +6407,7 @@
             </a:r>
             <a:r>
               <a:rPr lang="en-US" altLang="en-US" sz="2400" dirty="0" smtClean="0"/>
-              <a:t>user using </a:t>
-            </a:r>
-            <a:r>
-              <a:rPr lang="en-US" altLang="en-US" sz="2400" dirty="0" smtClean="0"/>
-              <a:t>tap </a:t>
-            </a:r>
-            <a:r>
-              <a:rPr lang="en-US" altLang="en-US" sz="2400" dirty="0" smtClean="0"/>
-              <a:t>interactions with the onscreen </a:t>
-            </a:r>
-            <a:r>
-              <a:rPr lang="en-US" altLang="en-US" sz="2400" dirty="0" smtClean="0"/>
-              <a:t>elements. </a:t>
-            </a:r>
-            <a:r>
-              <a:rPr lang="en-US" altLang="en-US" sz="2400" dirty="0" smtClean="0"/>
-              <a:t>In the current build (pending further user testing) we have avoided using swipe gestures as this can </a:t>
-            </a:r>
-            <a:r>
-              <a:rPr lang="en-US" altLang="en-US" sz="2400" dirty="0" smtClean="0"/>
-              <a:t>initially </a:t>
-            </a:r>
-            <a:r>
-              <a:rPr lang="en-US" altLang="en-US" sz="2400" dirty="0" smtClean="0"/>
-              <a:t>be unintuitive for young children.</a:t>
+              <a:t>user using tap interactions with the onscreen elements. In the current build (pending further user testing) we have avoided using swipe gestures as this can initially be unintuitive for young children.</a:t>
             </a:r>
           </a:p>
           <a:p>
@@ -6495,7 +6443,7 @@
   <p:timing>
     <p:tnLst>
       <p:par>
-        <p:cTn xmlns:p14="http://schemas.microsoft.com/office/powerpoint/2010/main" id="1" dur="indefinite" restart="never" nodeType="tmRoot"/>
+        <p:cTn id="1" dur="indefinite" restart="never" nodeType="tmRoot"/>
       </p:par>
     </p:tnLst>
   </p:timing>
@@ -6575,15 +6523,7 @@
           <a:p>
             <a:r>
               <a:rPr lang="en-GB" sz="2400" dirty="0" smtClean="0"/>
-              <a:t>Given the limited </a:t>
-            </a:r>
-            <a:r>
-              <a:rPr lang="en-GB" sz="2400" dirty="0" smtClean="0"/>
-              <a:t>familiarity with technology </a:t>
-            </a:r>
-            <a:r>
-              <a:rPr lang="en-GB" sz="2400" dirty="0" smtClean="0"/>
-              <a:t>of our target market we tried to ensure that design </a:t>
+              <a:t>Given the limited familiarity with technology of our target market we tried to ensure that design </a:t>
             </a:r>
             <a:r>
               <a:rPr lang="en-GB" sz="2400" dirty="0"/>
@@ -6751,7 +6691,7 @@
   <p:timing>
     <p:tnLst>
       <p:par>
-        <p:cTn xmlns:p14="http://schemas.microsoft.com/office/powerpoint/2010/main" id="1" dur="indefinite" restart="never" nodeType="tmRoot"/>
+        <p:cTn id="1" dur="indefinite" restart="never" nodeType="tmRoot"/>
       </p:par>
     </p:tnLst>
   </p:timing>
@@ -6840,15 +6780,7 @@
             </a:r>
             <a:r>
               <a:rPr lang="en-GB" sz="2000" dirty="0" smtClean="0"/>
-              <a:t>– The primary focus of our internal testing was to ensure that the technical aspects of the app were working. We extensively tested each feature to ensure that the app behaved as expected and that </a:t>
-            </a:r>
-            <a:r>
-              <a:rPr lang="en-GB" sz="2000" dirty="0" smtClean="0"/>
-              <a:t>identified bugs were </a:t>
-            </a:r>
-            <a:r>
-              <a:rPr lang="en-GB" sz="2000" dirty="0" smtClean="0"/>
-              <a:t>eliminated</a:t>
+              <a:t>– The primary focus of our internal testing was to ensure that the technical aspects of the app were working. We extensively tested each feature to ensure that the app behaved as expected and that identified bugs were eliminated</a:t>
             </a:r>
             <a:r>
               <a:rPr lang="en-GB" sz="2000" dirty="0"/>
@@ -6875,23 +6807,7 @@
             </a:r>
             <a:r>
               <a:rPr lang="en-GB" sz="2000" dirty="0" smtClean="0"/>
-              <a:t>– We tested </a:t>
-            </a:r>
-            <a:r>
-              <a:rPr lang="en-GB" sz="2000" dirty="0" smtClean="0"/>
-              <a:t>partially complete builds of </a:t>
-            </a:r>
-            <a:r>
-              <a:rPr lang="en-GB" sz="2000" dirty="0" smtClean="0"/>
-              <a:t>the app with members of our target audience, i.e. both young children and parents.  We noted down the results of the </a:t>
-            </a:r>
-            <a:r>
-              <a:rPr lang="en-GB" sz="2000" dirty="0" smtClean="0"/>
-              <a:t>feedback including </a:t>
-            </a:r>
-            <a:r>
-              <a:rPr lang="en-GB" sz="2000" dirty="0" smtClean="0"/>
-              <a:t>what they did and didn’t like about the overall design and used it to enhance the areas that were working and fix what was not.</a:t>
+              <a:t>– We tested partially complete builds of the app with members of our target audience, i.e. both young children and parents.  We noted down the results of the feedback including what they did and didn’t like about the overall design and used it to enhance the areas that were working and fix what was not.</a:t>
             </a:r>
             <a:endParaRPr lang="en-GB" sz="2000" dirty="0"/>
           </a:p>
@@ -6910,7 +6826,7 @@
   <p:timing>
     <p:tnLst>
       <p:par>
-        <p:cTn xmlns:p14="http://schemas.microsoft.com/office/powerpoint/2010/main" id="1" dur="indefinite" restart="never" nodeType="tmRoot"/>
+        <p:cTn id="1" dur="indefinite" restart="never" nodeType="tmRoot"/>
       </p:par>
     </p:tnLst>
   </p:timing>
@@ -6946,8 +6862,8 @@
         </p:nvSpPr>
         <p:spPr>
           <a:xfrm>
-            <a:off x="2606041" y="2743200"/>
-            <a:ext cx="6784848" cy="1115568"/>
+            <a:off x="1243584" y="2743200"/>
+            <a:ext cx="9720072" cy="1115568"/>
           </a:xfrm>
         </p:spPr>
         <p:txBody>
@@ -6957,7 +6873,25 @@
             <a:pPr algn="ctr"/>
             <a:r>
               <a:rPr lang="en-GB" sz="5400" b="1" dirty="0" smtClean="0"/>
-              <a:t>Live Demonstration</a:t>
+              <a:t>Live </a:t>
+            </a:r>
+            <a:r>
+              <a:rPr lang="en-GB" sz="5400" b="1" dirty="0" smtClean="0"/>
+              <a:t>Demonstration</a:t>
+            </a:r>
+            <a:br>
+              <a:rPr lang="en-GB" sz="5400" b="1" dirty="0" smtClean="0"/>
+            </a:br>
+            <a:r>
+              <a:rPr lang="en-GB" sz="5400" b="1" dirty="0" smtClean="0"/>
+              <a:t/>
+            </a:r>
+            <a:br>
+              <a:rPr lang="en-GB" sz="5400" b="1" dirty="0" smtClean="0"/>
+            </a:br>
+            <a:r>
+              <a:rPr lang="en-GB" sz="2400" b="1" dirty="0" smtClean="0"/>
+              <a:t>http://doc.gold.ac.uk/~aparm001/introdm/cw2/index.html</a:t>
             </a:r>
             <a:endParaRPr lang="en-GB" sz="5400" b="1" dirty="0"/>
           </a:p>
@@ -6973,6 +6907,13 @@
   <p:clrMapOvr>
     <a:masterClrMapping/>
   </p:clrMapOvr>
+  <p:timing>
+    <p:tnLst>
+      <p:par>
+        <p:cTn id="1" dur="indefinite" restart="never" nodeType="tmRoot"/>
+      </p:par>
+    </p:tnLst>
+  </p:timing>
 </p:sld>
 </file>
 
@@ -7233,7 +7174,7 @@
   <a:extraClrSchemeLst/>
   <a:extLst>
     <a:ext uri="{05A4C25C-085E-4340-85A3-A5531E510DB2}">
-      <thm15:themeFamily xmlns:thm15="http://schemas.microsoft.com/office/thememl/2012/main" xmlns="" name="Ion" id="{B8441ADB-2E43-4AF7-B97A-BD870242C6A8}" vid="{5A2F9111-B2DB-470C-BA56-608F9B658826}"/>
+      <thm15:themeFamily xmlns:thm15="http://schemas.microsoft.com/office/thememl/2012/main" name="Ion" id="{B8441ADB-2E43-4AF7-B97A-BD870242C6A8}" vid="{5A2F9111-B2DB-470C-BA56-608F9B658826}"/>
     </a:ext>
   </a:extLst>
 </a:theme>

</xml_diff>